<commit_message>
Lavoro ufficio 19 01 2024
</commit_message>
<xml_diff>
--- a/Figures/Maps_selections/Map_selections.pptx
+++ b/Figures/Maps_selections/Map_selections.pptx
@@ -108,6 +108,11 @@
       </a:defRPr>
     </a:lvl9pPr>
   </p:defaultTextStyle>
+  <p:extLst>
+    <p:ext uri="{EFAFB233-063F-42B5-8137-9DF3F51BA10A}">
+      <p15:sldGuideLst xmlns:p15="http://schemas.microsoft.com/office/powerpoint/2012/main"/>
+    </p:ext>
+  </p:extLst>
 </p:presentation>
 </file>
 
@@ -242,7 +247,7 @@
           <a:p>
             <a:fld id="{360BC13B-838B-4210-9B8A-B243FA4A3558}" type="datetimeFigureOut">
               <a:rPr lang="it-IT" smtClean="0"/>
-              <a:t>01/01/2024</a:t>
+              <a:t>19/01/2024</a:t>
             </a:fld>
             <a:endParaRPr lang="it-IT"/>
           </a:p>
@@ -412,7 +417,7 @@
           <a:p>
             <a:fld id="{360BC13B-838B-4210-9B8A-B243FA4A3558}" type="datetimeFigureOut">
               <a:rPr lang="it-IT" smtClean="0"/>
-              <a:t>01/01/2024</a:t>
+              <a:t>19/01/2024</a:t>
             </a:fld>
             <a:endParaRPr lang="it-IT"/>
           </a:p>
@@ -592,7 +597,7 @@
           <a:p>
             <a:fld id="{360BC13B-838B-4210-9B8A-B243FA4A3558}" type="datetimeFigureOut">
               <a:rPr lang="it-IT" smtClean="0"/>
-              <a:t>01/01/2024</a:t>
+              <a:t>19/01/2024</a:t>
             </a:fld>
             <a:endParaRPr lang="it-IT"/>
           </a:p>
@@ -762,7 +767,7 @@
           <a:p>
             <a:fld id="{360BC13B-838B-4210-9B8A-B243FA4A3558}" type="datetimeFigureOut">
               <a:rPr lang="it-IT" smtClean="0"/>
-              <a:t>01/01/2024</a:t>
+              <a:t>19/01/2024</a:t>
             </a:fld>
             <a:endParaRPr lang="it-IT"/>
           </a:p>
@@ -1006,7 +1011,7 @@
           <a:p>
             <a:fld id="{360BC13B-838B-4210-9B8A-B243FA4A3558}" type="datetimeFigureOut">
               <a:rPr lang="it-IT" smtClean="0"/>
-              <a:t>01/01/2024</a:t>
+              <a:t>19/01/2024</a:t>
             </a:fld>
             <a:endParaRPr lang="it-IT"/>
           </a:p>
@@ -1238,7 +1243,7 @@
           <a:p>
             <a:fld id="{360BC13B-838B-4210-9B8A-B243FA4A3558}" type="datetimeFigureOut">
               <a:rPr lang="it-IT" smtClean="0"/>
-              <a:t>01/01/2024</a:t>
+              <a:t>19/01/2024</a:t>
             </a:fld>
             <a:endParaRPr lang="it-IT"/>
           </a:p>
@@ -1605,7 +1610,7 @@
           <a:p>
             <a:fld id="{360BC13B-838B-4210-9B8A-B243FA4A3558}" type="datetimeFigureOut">
               <a:rPr lang="it-IT" smtClean="0"/>
-              <a:t>01/01/2024</a:t>
+              <a:t>19/01/2024</a:t>
             </a:fld>
             <a:endParaRPr lang="it-IT"/>
           </a:p>
@@ -1723,7 +1728,7 @@
           <a:p>
             <a:fld id="{360BC13B-838B-4210-9B8A-B243FA4A3558}" type="datetimeFigureOut">
               <a:rPr lang="it-IT" smtClean="0"/>
-              <a:t>01/01/2024</a:t>
+              <a:t>19/01/2024</a:t>
             </a:fld>
             <a:endParaRPr lang="it-IT"/>
           </a:p>
@@ -1818,7 +1823,7 @@
           <a:p>
             <a:fld id="{360BC13B-838B-4210-9B8A-B243FA4A3558}" type="datetimeFigureOut">
               <a:rPr lang="it-IT" smtClean="0"/>
-              <a:t>01/01/2024</a:t>
+              <a:t>19/01/2024</a:t>
             </a:fld>
             <a:endParaRPr lang="it-IT"/>
           </a:p>
@@ -2095,7 +2100,7 @@
           <a:p>
             <a:fld id="{360BC13B-838B-4210-9B8A-B243FA4A3558}" type="datetimeFigureOut">
               <a:rPr lang="it-IT" smtClean="0"/>
-              <a:t>01/01/2024</a:t>
+              <a:t>19/01/2024</a:t>
             </a:fld>
             <a:endParaRPr lang="it-IT"/>
           </a:p>
@@ -2352,7 +2357,7 @@
           <a:p>
             <a:fld id="{360BC13B-838B-4210-9B8A-B243FA4A3558}" type="datetimeFigureOut">
               <a:rPr lang="it-IT" smtClean="0"/>
-              <a:t>01/01/2024</a:t>
+              <a:t>19/01/2024</a:t>
             </a:fld>
             <a:endParaRPr lang="it-IT"/>
           </a:p>
@@ -2565,7 +2570,7 @@
           <a:p>
             <a:fld id="{360BC13B-838B-4210-9B8A-B243FA4A3558}" type="datetimeFigureOut">
               <a:rPr lang="it-IT" smtClean="0"/>
-              <a:t>01/01/2024</a:t>
+              <a:t>19/01/2024</a:t>
             </a:fld>
             <a:endParaRPr lang="it-IT"/>
           </a:p>
@@ -3794,10 +3799,10 @@
       </p:pic>
       <p:pic>
         <p:nvPicPr>
-          <p:cNvPr id="7" name="Immagine 6">
+          <p:cNvPr id="3" name="Immagine 2" descr="Immagine che contiene testo, mappa, atlante&#10;&#10;Descrizione generata automaticamente">
             <a:extLst>
               <a:ext uri="{FF2B5EF4-FFF2-40B4-BE49-F238E27FC236}">
-                <a16:creationId xmlns:a16="http://schemas.microsoft.com/office/drawing/2014/main" id="{11678FEF-F311-D8A9-5C30-83C4609FDBAF}"/>
+                <a16:creationId xmlns:a16="http://schemas.microsoft.com/office/drawing/2014/main" id="{AE1578AE-9D5B-08CB-D82D-1EBA6DC8067B}"/>
               </a:ext>
             </a:extLst>
           </p:cNvPr>
@@ -3820,23 +3825,20 @@
         </p:blipFill>
         <p:spPr>
           <a:xfrm>
-            <a:off x="0" y="2916497"/>
+            <a:off x="25400" y="2948414"/>
             <a:ext cx="6858000" cy="2742329"/>
           </a:xfrm>
           <a:prstGeom prst="rect">
             <a:avLst/>
           </a:prstGeom>
-          <a:ln>
-            <a:noFill/>
-          </a:ln>
         </p:spPr>
       </p:pic>
       <p:pic>
         <p:nvPicPr>
-          <p:cNvPr id="9" name="Immagine 8">
+          <p:cNvPr id="6" name="Immagine 5" descr="Immagine che contiene testo, mappa, atlante&#10;&#10;Descrizione generata automaticamente">
             <a:extLst>
               <a:ext uri="{FF2B5EF4-FFF2-40B4-BE49-F238E27FC236}">
-                <a16:creationId xmlns:a16="http://schemas.microsoft.com/office/drawing/2014/main" id="{752391C1-4241-B8CE-BBA8-1EA9C11E70B5}"/>
+                <a16:creationId xmlns:a16="http://schemas.microsoft.com/office/drawing/2014/main" id="{1F401F8C-6787-6C77-D374-A7E2D0520D99}"/>
               </a:ext>
             </a:extLst>
           </p:cNvPr>
@@ -3859,15 +3861,12 @@
         </p:blipFill>
         <p:spPr>
           <a:xfrm>
-            <a:off x="0" y="5832994"/>
+            <a:off x="10300" y="5832994"/>
             <a:ext cx="6858000" cy="2742329"/>
           </a:xfrm>
           <a:prstGeom prst="rect">
             <a:avLst/>
           </a:prstGeom>
-          <a:ln>
-            <a:noFill/>
-          </a:ln>
         </p:spPr>
       </p:pic>
     </p:spTree>

</xml_diff>